<commit_message>
Minor update to the powerpoint.
</commit_message>
<xml_diff>
--- a/CasualHeroes.pptx
+++ b/CasualHeroes.pptx
@@ -10,6 +10,7 @@
     <p:sldId id="257" r:id="rId4"/>
     <p:sldId id="258" r:id="rId5"/>
     <p:sldId id="261" r:id="rId6"/>
+    <p:sldId id="262" r:id="rId7"/>
   </p:sldIdLst>
   <p:sldSz cx="9144000" cy="5143500" type="screen16x9"/>
   <p:notesSz cx="6858000" cy="9144000"/>
@@ -5051,7 +5052,7 @@
                 </a:solidFill>
                 <a:latin typeface="Avenir Next Heavy"/>
               </a:rPr>
-              <a:t>The Casual heroes…</a:t>
+              <a:t>The Technology…</a:t>
             </a:r>
             <a:endParaRPr lang="en-US" dirty="0">
               <a:solidFill>
@@ -5084,8 +5085,23 @@
                 </a:solidFill>
                 <a:latin typeface="Avenir Black Oblique"/>
               </a:rPr>
-              <a:t>Tor Harrington</a:t>
-            </a:r>
+              <a:t>HTML5 / </a:t>
+            </a:r>
+            <a:r>
+              <a:rPr lang="en-US" dirty="0" err="1" smtClean="0">
+                <a:solidFill>
+                  <a:schemeClr val="tx2"/>
+                </a:solidFill>
+                <a:latin typeface="Avenir Black Oblique"/>
+              </a:rPr>
+              <a:t>jQuery</a:t>
+            </a:r>
+            <a:endParaRPr lang="en-US" dirty="0" smtClean="0">
+              <a:solidFill>
+                <a:schemeClr val="tx2"/>
+              </a:solidFill>
+              <a:latin typeface="Avenir Black Oblique"/>
+            </a:endParaRPr>
           </a:p>
           <a:p>
             <a:r>
@@ -5095,10 +5111,17 @@
                 </a:solidFill>
                 <a:latin typeface="Avenir Black Oblique"/>
               </a:rPr>
-              <a:t>Patrick Mooney</a:t>
-            </a:r>
-          </a:p>
-          <a:p>
+              <a:t>REST </a:t>
+            </a:r>
+            <a:r>
+              <a:rPr lang="en-US" dirty="0" err="1" smtClean="0">
+                <a:solidFill>
+                  <a:schemeClr val="tx2"/>
+                </a:solidFill>
+                <a:latin typeface="Avenir Black Oblique"/>
+              </a:rPr>
+              <a:t>WebAPI</a:t>
+            </a:r>
             <a:r>
               <a:rPr lang="en-US" dirty="0" smtClean="0">
                 <a:solidFill>
@@ -5106,8 +5129,32 @@
                 </a:solidFill>
                 <a:latin typeface="Avenir Black Oblique"/>
               </a:rPr>
-              <a:t>William </a:t>
-            </a:r>
+              <a:t> Services</a:t>
+            </a:r>
+          </a:p>
+          <a:p>
+            <a:r>
+              <a:rPr lang="en-US" dirty="0" smtClean="0">
+                <a:solidFill>
+                  <a:schemeClr val="tx2"/>
+                </a:solidFill>
+                <a:latin typeface="Avenir Black Oblique"/>
+              </a:rPr>
+              <a:t>Azure Mobile Services</a:t>
+            </a:r>
+          </a:p>
+          <a:p>
+            <a:r>
+              <a:rPr lang="en-US" dirty="0" smtClean="0">
+                <a:solidFill>
+                  <a:schemeClr val="tx2"/>
+                </a:solidFill>
+                <a:latin typeface="Avenir Black Oblique"/>
+              </a:rPr>
+              <a:t>SQL Azure Database</a:t>
+            </a:r>
+          </a:p>
+          <a:p>
             <a:r>
               <a:rPr lang="en-US" dirty="0" err="1" smtClean="0">
                 <a:solidFill>
@@ -5115,16 +5162,8 @@
                 </a:solidFill>
                 <a:latin typeface="Avenir Black Oblique"/>
               </a:rPr>
-              <a:t>Wedin</a:t>
-            </a:r>
-            <a:endParaRPr lang="en-US" dirty="0" smtClean="0">
-              <a:solidFill>
-                <a:schemeClr val="tx2"/>
-              </a:solidFill>
-              <a:latin typeface="Avenir Black Oblique"/>
-            </a:endParaRPr>
-          </a:p>
-          <a:p>
+              <a:t>Github</a:t>
+            </a:r>
             <a:r>
               <a:rPr lang="en-US" dirty="0" smtClean="0">
                 <a:solidFill>
@@ -5132,7 +5171,7 @@
                 </a:solidFill>
                 <a:latin typeface="Avenir Black Oblique"/>
               </a:rPr>
-              <a:t>Robert McCartney</a:t>
+              <a:t> source control</a:t>
             </a:r>
           </a:p>
           <a:p>
@@ -5143,7 +5182,7 @@
                 </a:solidFill>
                 <a:latin typeface="Avenir Black Oblique"/>
               </a:rPr>
-              <a:t>Joel Hammond-Turner</a:t>
+              <a:t>Azure Websites</a:t>
             </a:r>
           </a:p>
           <a:p>
@@ -5154,7 +5193,18 @@
                 </a:solidFill>
                 <a:latin typeface="Avenir Black Oblique"/>
               </a:rPr>
-              <a:t>James C</a:t>
+              <a:t>Google Maps</a:t>
+            </a:r>
+          </a:p>
+          <a:p>
+            <a:r>
+              <a:rPr lang="en-US" dirty="0" smtClean="0">
+                <a:solidFill>
+                  <a:schemeClr val="tx2"/>
+                </a:solidFill>
+                <a:latin typeface="Avenir Black Oblique"/>
+              </a:rPr>
+              <a:t>Native Android client / Java</a:t>
             </a:r>
             <a:endParaRPr lang="en-US" dirty="0">
               <a:solidFill>
@@ -5199,6 +5249,693 @@
     <p:extLst>
       <p:ext uri="{BB962C8B-B14F-4D97-AF65-F5344CB8AC3E}">
         <p14:creationId xmlns:p14="http://schemas.microsoft.com/office/powerpoint/2010/main" val="2198452933"/>
+      </p:ext>
+    </p:extLst>
+  </p:cSld>
+  <p:clrMapOvr>
+    <a:masterClrMapping/>
+  </p:clrMapOvr>
+  <mc:AlternateContent xmlns:mc="http://schemas.openxmlformats.org/markup-compatibility/2006">
+    <mc:Choice xmlns:p14="http://schemas.microsoft.com/office/powerpoint/2010/main" Requires="p14">
+      <p:transition spd="med" p14:dur="700">
+        <p:fade/>
+      </p:transition>
+    </mc:Choice>
+    <mc:Fallback>
+      <p:transition xmlns:p14="http://schemas.microsoft.com/office/powerpoint/2010/main" spd="med">
+        <p:fade/>
+      </p:transition>
+    </mc:Fallback>
+  </mc:AlternateContent>
+  <p:timing>
+    <p:tnLst>
+      <p:par>
+        <p:cTn xmlns:p14="http://schemas.microsoft.com/office/powerpoint/2010/main" id="1" dur="indefinite" restart="never" nodeType="tmRoot">
+          <p:childTnLst>
+            <p:seq concurrent="1" nextAc="seek">
+              <p:cTn id="2" dur="indefinite" nodeType="mainSeq">
+                <p:childTnLst>
+                  <p:par>
+                    <p:cTn id="3" fill="hold">
+                      <p:stCondLst>
+                        <p:cond delay="indefinite"/>
+                        <p:cond evt="onBegin" delay="0">
+                          <p:tn val="2"/>
+                        </p:cond>
+                      </p:stCondLst>
+                      <p:childTnLst>
+                        <p:par>
+                          <p:cTn id="4" fill="hold">
+                            <p:stCondLst>
+                              <p:cond delay="0"/>
+                            </p:stCondLst>
+                            <p:childTnLst>
+                              <p:par>
+                                <p:cTn id="5" presetID="10" presetClass="entr" presetSubtype="0" fill="hold" grpId="0" nodeType="afterEffect">
+                                  <p:stCondLst>
+                                    <p:cond delay="0"/>
+                                  </p:stCondLst>
+                                  <p:childTnLst>
+                                    <p:set>
+                                      <p:cBhvr>
+                                        <p:cTn id="6" dur="1" fill="hold">
+                                          <p:stCondLst>
+                                            <p:cond delay="0"/>
+                                          </p:stCondLst>
+                                        </p:cTn>
+                                        <p:tgtEl>
+                                          <p:spTgt spid="3">
+                                            <p:txEl>
+                                              <p:pRg st="0" end="0"/>
+                                            </p:txEl>
+                                          </p:spTgt>
+                                        </p:tgtEl>
+                                        <p:attrNameLst>
+                                          <p:attrName>style.visibility</p:attrName>
+                                        </p:attrNameLst>
+                                      </p:cBhvr>
+                                      <p:to>
+                                        <p:strVal val="visible"/>
+                                      </p:to>
+                                    </p:set>
+                                    <p:animEffect transition="in" filter="fade">
+                                      <p:cBhvr>
+                                        <p:cTn id="7" dur="500"/>
+                                        <p:tgtEl>
+                                          <p:spTgt spid="3">
+                                            <p:txEl>
+                                              <p:pRg st="0" end="0"/>
+                                            </p:txEl>
+                                          </p:spTgt>
+                                        </p:tgtEl>
+                                      </p:cBhvr>
+                                    </p:animEffect>
+                                  </p:childTnLst>
+                                </p:cTn>
+                              </p:par>
+                            </p:childTnLst>
+                          </p:cTn>
+                        </p:par>
+                        <p:par>
+                          <p:cTn id="8" fill="hold">
+                            <p:stCondLst>
+                              <p:cond delay="500"/>
+                            </p:stCondLst>
+                            <p:childTnLst>
+                              <p:par>
+                                <p:cTn id="9" presetID="10" presetClass="entr" presetSubtype="0" fill="hold" grpId="0" nodeType="afterEffect">
+                                  <p:stCondLst>
+                                    <p:cond delay="0"/>
+                                  </p:stCondLst>
+                                  <p:childTnLst>
+                                    <p:set>
+                                      <p:cBhvr>
+                                        <p:cTn id="10" dur="1" fill="hold">
+                                          <p:stCondLst>
+                                            <p:cond delay="0"/>
+                                          </p:stCondLst>
+                                        </p:cTn>
+                                        <p:tgtEl>
+                                          <p:spTgt spid="3">
+                                            <p:txEl>
+                                              <p:pRg st="1" end="1"/>
+                                            </p:txEl>
+                                          </p:spTgt>
+                                        </p:tgtEl>
+                                        <p:attrNameLst>
+                                          <p:attrName>style.visibility</p:attrName>
+                                        </p:attrNameLst>
+                                      </p:cBhvr>
+                                      <p:to>
+                                        <p:strVal val="visible"/>
+                                      </p:to>
+                                    </p:set>
+                                    <p:animEffect transition="in" filter="fade">
+                                      <p:cBhvr>
+                                        <p:cTn id="11" dur="500"/>
+                                        <p:tgtEl>
+                                          <p:spTgt spid="3">
+                                            <p:txEl>
+                                              <p:pRg st="1" end="1"/>
+                                            </p:txEl>
+                                          </p:spTgt>
+                                        </p:tgtEl>
+                                      </p:cBhvr>
+                                    </p:animEffect>
+                                  </p:childTnLst>
+                                </p:cTn>
+                              </p:par>
+                            </p:childTnLst>
+                          </p:cTn>
+                        </p:par>
+                        <p:par>
+                          <p:cTn id="12" fill="hold">
+                            <p:stCondLst>
+                              <p:cond delay="1000"/>
+                            </p:stCondLst>
+                            <p:childTnLst>
+                              <p:par>
+                                <p:cTn id="13" presetID="10" presetClass="entr" presetSubtype="0" fill="hold" grpId="0" nodeType="afterEffect">
+                                  <p:stCondLst>
+                                    <p:cond delay="0"/>
+                                  </p:stCondLst>
+                                  <p:childTnLst>
+                                    <p:set>
+                                      <p:cBhvr>
+                                        <p:cTn id="14" dur="1" fill="hold">
+                                          <p:stCondLst>
+                                            <p:cond delay="0"/>
+                                          </p:stCondLst>
+                                        </p:cTn>
+                                        <p:tgtEl>
+                                          <p:spTgt spid="3">
+                                            <p:txEl>
+                                              <p:pRg st="2" end="2"/>
+                                            </p:txEl>
+                                          </p:spTgt>
+                                        </p:tgtEl>
+                                        <p:attrNameLst>
+                                          <p:attrName>style.visibility</p:attrName>
+                                        </p:attrNameLst>
+                                      </p:cBhvr>
+                                      <p:to>
+                                        <p:strVal val="visible"/>
+                                      </p:to>
+                                    </p:set>
+                                    <p:animEffect transition="in" filter="fade">
+                                      <p:cBhvr>
+                                        <p:cTn id="15" dur="500"/>
+                                        <p:tgtEl>
+                                          <p:spTgt spid="3">
+                                            <p:txEl>
+                                              <p:pRg st="2" end="2"/>
+                                            </p:txEl>
+                                          </p:spTgt>
+                                        </p:tgtEl>
+                                      </p:cBhvr>
+                                    </p:animEffect>
+                                  </p:childTnLst>
+                                </p:cTn>
+                              </p:par>
+                            </p:childTnLst>
+                          </p:cTn>
+                        </p:par>
+                        <p:par>
+                          <p:cTn id="16" fill="hold">
+                            <p:stCondLst>
+                              <p:cond delay="1500"/>
+                            </p:stCondLst>
+                            <p:childTnLst>
+                              <p:par>
+                                <p:cTn id="17" presetID="10" presetClass="entr" presetSubtype="0" fill="hold" grpId="0" nodeType="afterEffect">
+                                  <p:stCondLst>
+                                    <p:cond delay="0"/>
+                                  </p:stCondLst>
+                                  <p:childTnLst>
+                                    <p:set>
+                                      <p:cBhvr>
+                                        <p:cTn id="18" dur="1" fill="hold">
+                                          <p:stCondLst>
+                                            <p:cond delay="0"/>
+                                          </p:stCondLst>
+                                        </p:cTn>
+                                        <p:tgtEl>
+                                          <p:spTgt spid="3">
+                                            <p:txEl>
+                                              <p:pRg st="3" end="3"/>
+                                            </p:txEl>
+                                          </p:spTgt>
+                                        </p:tgtEl>
+                                        <p:attrNameLst>
+                                          <p:attrName>style.visibility</p:attrName>
+                                        </p:attrNameLst>
+                                      </p:cBhvr>
+                                      <p:to>
+                                        <p:strVal val="visible"/>
+                                      </p:to>
+                                    </p:set>
+                                    <p:animEffect transition="in" filter="fade">
+                                      <p:cBhvr>
+                                        <p:cTn id="19" dur="500"/>
+                                        <p:tgtEl>
+                                          <p:spTgt spid="3">
+                                            <p:txEl>
+                                              <p:pRg st="3" end="3"/>
+                                            </p:txEl>
+                                          </p:spTgt>
+                                        </p:tgtEl>
+                                      </p:cBhvr>
+                                    </p:animEffect>
+                                  </p:childTnLst>
+                                </p:cTn>
+                              </p:par>
+                            </p:childTnLst>
+                          </p:cTn>
+                        </p:par>
+                        <p:par>
+                          <p:cTn id="20" fill="hold">
+                            <p:stCondLst>
+                              <p:cond delay="2000"/>
+                            </p:stCondLst>
+                            <p:childTnLst>
+                              <p:par>
+                                <p:cTn id="21" presetID="10" presetClass="entr" presetSubtype="0" fill="hold" grpId="0" nodeType="afterEffect">
+                                  <p:stCondLst>
+                                    <p:cond delay="0"/>
+                                  </p:stCondLst>
+                                  <p:childTnLst>
+                                    <p:set>
+                                      <p:cBhvr>
+                                        <p:cTn id="22" dur="1" fill="hold">
+                                          <p:stCondLst>
+                                            <p:cond delay="0"/>
+                                          </p:stCondLst>
+                                        </p:cTn>
+                                        <p:tgtEl>
+                                          <p:spTgt spid="3">
+                                            <p:txEl>
+                                              <p:pRg st="4" end="4"/>
+                                            </p:txEl>
+                                          </p:spTgt>
+                                        </p:tgtEl>
+                                        <p:attrNameLst>
+                                          <p:attrName>style.visibility</p:attrName>
+                                        </p:attrNameLst>
+                                      </p:cBhvr>
+                                      <p:to>
+                                        <p:strVal val="visible"/>
+                                      </p:to>
+                                    </p:set>
+                                    <p:animEffect transition="in" filter="fade">
+                                      <p:cBhvr>
+                                        <p:cTn id="23" dur="500"/>
+                                        <p:tgtEl>
+                                          <p:spTgt spid="3">
+                                            <p:txEl>
+                                              <p:pRg st="4" end="4"/>
+                                            </p:txEl>
+                                          </p:spTgt>
+                                        </p:tgtEl>
+                                      </p:cBhvr>
+                                    </p:animEffect>
+                                  </p:childTnLst>
+                                </p:cTn>
+                              </p:par>
+                            </p:childTnLst>
+                          </p:cTn>
+                        </p:par>
+                        <p:par>
+                          <p:cTn id="24" fill="hold">
+                            <p:stCondLst>
+                              <p:cond delay="2500"/>
+                            </p:stCondLst>
+                            <p:childTnLst>
+                              <p:par>
+                                <p:cTn id="25" presetID="10" presetClass="entr" presetSubtype="0" fill="hold" grpId="0" nodeType="afterEffect">
+                                  <p:stCondLst>
+                                    <p:cond delay="0"/>
+                                  </p:stCondLst>
+                                  <p:childTnLst>
+                                    <p:set>
+                                      <p:cBhvr>
+                                        <p:cTn id="26" dur="1" fill="hold">
+                                          <p:stCondLst>
+                                            <p:cond delay="0"/>
+                                          </p:stCondLst>
+                                        </p:cTn>
+                                        <p:tgtEl>
+                                          <p:spTgt spid="3">
+                                            <p:txEl>
+                                              <p:pRg st="5" end="5"/>
+                                            </p:txEl>
+                                          </p:spTgt>
+                                        </p:tgtEl>
+                                        <p:attrNameLst>
+                                          <p:attrName>style.visibility</p:attrName>
+                                        </p:attrNameLst>
+                                      </p:cBhvr>
+                                      <p:to>
+                                        <p:strVal val="visible"/>
+                                      </p:to>
+                                    </p:set>
+                                    <p:animEffect transition="in" filter="fade">
+                                      <p:cBhvr>
+                                        <p:cTn id="27" dur="500"/>
+                                        <p:tgtEl>
+                                          <p:spTgt spid="3">
+                                            <p:txEl>
+                                              <p:pRg st="5" end="5"/>
+                                            </p:txEl>
+                                          </p:spTgt>
+                                        </p:tgtEl>
+                                      </p:cBhvr>
+                                    </p:animEffect>
+                                  </p:childTnLst>
+                                </p:cTn>
+                              </p:par>
+                            </p:childTnLst>
+                          </p:cTn>
+                        </p:par>
+                        <p:par>
+                          <p:cTn id="28" fill="hold">
+                            <p:stCondLst>
+                              <p:cond delay="3000"/>
+                            </p:stCondLst>
+                            <p:childTnLst>
+                              <p:par>
+                                <p:cTn id="29" presetID="10" presetClass="entr" presetSubtype="0" fill="hold" grpId="0" nodeType="afterEffect">
+                                  <p:stCondLst>
+                                    <p:cond delay="0"/>
+                                  </p:stCondLst>
+                                  <p:childTnLst>
+                                    <p:set>
+                                      <p:cBhvr>
+                                        <p:cTn id="30" dur="1" fill="hold">
+                                          <p:stCondLst>
+                                            <p:cond delay="0"/>
+                                          </p:stCondLst>
+                                        </p:cTn>
+                                        <p:tgtEl>
+                                          <p:spTgt spid="3">
+                                            <p:txEl>
+                                              <p:pRg st="6" end="6"/>
+                                            </p:txEl>
+                                          </p:spTgt>
+                                        </p:tgtEl>
+                                        <p:attrNameLst>
+                                          <p:attrName>style.visibility</p:attrName>
+                                        </p:attrNameLst>
+                                      </p:cBhvr>
+                                      <p:to>
+                                        <p:strVal val="visible"/>
+                                      </p:to>
+                                    </p:set>
+                                    <p:animEffect transition="in" filter="fade">
+                                      <p:cBhvr>
+                                        <p:cTn id="31" dur="500"/>
+                                        <p:tgtEl>
+                                          <p:spTgt spid="3">
+                                            <p:txEl>
+                                              <p:pRg st="6" end="6"/>
+                                            </p:txEl>
+                                          </p:spTgt>
+                                        </p:tgtEl>
+                                      </p:cBhvr>
+                                    </p:animEffect>
+                                  </p:childTnLst>
+                                </p:cTn>
+                              </p:par>
+                            </p:childTnLst>
+                          </p:cTn>
+                        </p:par>
+                        <p:par>
+                          <p:cTn id="32" fill="hold">
+                            <p:stCondLst>
+                              <p:cond delay="3500"/>
+                            </p:stCondLst>
+                            <p:childTnLst>
+                              <p:par>
+                                <p:cTn id="33" presetID="10" presetClass="entr" presetSubtype="0" fill="hold" grpId="0" nodeType="afterEffect">
+                                  <p:stCondLst>
+                                    <p:cond delay="0"/>
+                                  </p:stCondLst>
+                                  <p:childTnLst>
+                                    <p:set>
+                                      <p:cBhvr>
+                                        <p:cTn id="34" dur="1" fill="hold">
+                                          <p:stCondLst>
+                                            <p:cond delay="0"/>
+                                          </p:stCondLst>
+                                        </p:cTn>
+                                        <p:tgtEl>
+                                          <p:spTgt spid="3">
+                                            <p:txEl>
+                                              <p:pRg st="7" end="7"/>
+                                            </p:txEl>
+                                          </p:spTgt>
+                                        </p:tgtEl>
+                                        <p:attrNameLst>
+                                          <p:attrName>style.visibility</p:attrName>
+                                        </p:attrNameLst>
+                                      </p:cBhvr>
+                                      <p:to>
+                                        <p:strVal val="visible"/>
+                                      </p:to>
+                                    </p:set>
+                                    <p:animEffect transition="in" filter="fade">
+                                      <p:cBhvr>
+                                        <p:cTn id="35" dur="500"/>
+                                        <p:tgtEl>
+                                          <p:spTgt spid="3">
+                                            <p:txEl>
+                                              <p:pRg st="7" end="7"/>
+                                            </p:txEl>
+                                          </p:spTgt>
+                                        </p:tgtEl>
+                                      </p:cBhvr>
+                                    </p:animEffect>
+                                  </p:childTnLst>
+                                </p:cTn>
+                              </p:par>
+                            </p:childTnLst>
+                          </p:cTn>
+                        </p:par>
+                      </p:childTnLst>
+                    </p:cTn>
+                  </p:par>
+                </p:childTnLst>
+              </p:cTn>
+              <p:prevCondLst>
+                <p:cond evt="onPrev" delay="0">
+                  <p:tgtEl>
+                    <p:sldTgt/>
+                  </p:tgtEl>
+                </p:cond>
+              </p:prevCondLst>
+              <p:nextCondLst>
+                <p:cond evt="onNext" delay="0">
+                  <p:tgtEl>
+                    <p:sldTgt/>
+                  </p:tgtEl>
+                </p:cond>
+              </p:nextCondLst>
+            </p:seq>
+          </p:childTnLst>
+        </p:cTn>
+      </p:par>
+    </p:tnLst>
+    <p:bldLst>
+      <p:bldP spid="3" grpId="0" build="p"/>
+    </p:bldLst>
+  </p:timing>
+</p:sld>
+</file>
+
+<file path=ppt/slides/slide6.xml><?xml version="1.0" encoding="utf-8"?>
+<p:sld xmlns:a="http://schemas.openxmlformats.org/drawingml/2006/main" xmlns:r="http://schemas.openxmlformats.org/officeDocument/2006/relationships" xmlns:p="http://schemas.openxmlformats.org/presentationml/2006/main">
+  <p:cSld>
+    <p:spTree>
+      <p:nvGrpSpPr>
+        <p:cNvPr id="1" name=""/>
+        <p:cNvGrpSpPr/>
+        <p:nvPr/>
+      </p:nvGrpSpPr>
+      <p:grpSpPr>
+        <a:xfrm>
+          <a:off x="0" y="0"/>
+          <a:ext cx="0" cy="0"/>
+          <a:chOff x="0" y="0"/>
+          <a:chExt cx="0" cy="0"/>
+        </a:xfrm>
+      </p:grpSpPr>
+      <p:sp>
+        <p:nvSpPr>
+          <p:cNvPr id="2" name="Title 1"/>
+          <p:cNvSpPr>
+            <a:spLocks noGrp="1"/>
+          </p:cNvSpPr>
+          <p:nvPr>
+            <p:ph type="title"/>
+          </p:nvPr>
+        </p:nvSpPr>
+        <p:spPr/>
+        <p:txBody>
+          <a:bodyPr/>
+          <a:lstStyle/>
+          <a:p>
+            <a:r>
+              <a:rPr lang="en-US" dirty="0" smtClean="0">
+                <a:solidFill>
+                  <a:schemeClr val="tx2"/>
+                </a:solidFill>
+                <a:latin typeface="Avenir Next Heavy"/>
+              </a:rPr>
+              <a:t>The Casual heroes…</a:t>
+            </a:r>
+            <a:endParaRPr lang="en-US" dirty="0">
+              <a:solidFill>
+                <a:schemeClr val="tx2"/>
+              </a:solidFill>
+              <a:latin typeface="Avenir Next Heavy"/>
+            </a:endParaRPr>
+          </a:p>
+        </p:txBody>
+      </p:sp>
+      <p:sp>
+        <p:nvSpPr>
+          <p:cNvPr id="3" name="Content Placeholder 2"/>
+          <p:cNvSpPr>
+            <a:spLocks noGrp="1"/>
+          </p:cNvSpPr>
+          <p:nvPr>
+            <p:ph sz="quarter" idx="13"/>
+          </p:nvPr>
+        </p:nvSpPr>
+        <p:spPr/>
+        <p:txBody>
+          <a:bodyPr/>
+          <a:lstStyle/>
+          <a:p>
+            <a:r>
+              <a:rPr lang="en-US" dirty="0">
+                <a:solidFill>
+                  <a:schemeClr val="tx2"/>
+                </a:solidFill>
+                <a:latin typeface="Avenir Black Oblique"/>
+              </a:rPr>
+              <a:t>William </a:t>
+            </a:r>
+            <a:r>
+              <a:rPr lang="en-US" dirty="0" err="1">
+                <a:solidFill>
+                  <a:schemeClr val="tx2"/>
+                </a:solidFill>
+                <a:latin typeface="Avenir Black Oblique"/>
+              </a:rPr>
+              <a:t>Wedin</a:t>
+            </a:r>
+            <a:endParaRPr lang="en-US" dirty="0">
+              <a:solidFill>
+                <a:schemeClr val="tx2"/>
+              </a:solidFill>
+              <a:latin typeface="Avenir Black Oblique"/>
+            </a:endParaRPr>
+          </a:p>
+          <a:p>
+            <a:r>
+              <a:rPr lang="en-US" dirty="0" smtClean="0">
+                <a:solidFill>
+                  <a:schemeClr val="tx2"/>
+                </a:solidFill>
+                <a:latin typeface="Avenir Black Oblique"/>
+              </a:rPr>
+              <a:t>Tor Harrington</a:t>
+            </a:r>
+          </a:p>
+          <a:p>
+            <a:r>
+              <a:rPr lang="en-US" dirty="0">
+                <a:solidFill>
+                  <a:schemeClr val="tx2"/>
+                </a:solidFill>
+                <a:latin typeface="Avenir Black Oblique"/>
+              </a:rPr>
+              <a:t>Robert McCartney</a:t>
+            </a:r>
+          </a:p>
+          <a:p>
+            <a:r>
+              <a:rPr lang="en-US" dirty="0" smtClean="0">
+                <a:solidFill>
+                  <a:schemeClr val="tx2"/>
+                </a:solidFill>
+                <a:latin typeface="Avenir Black Oblique"/>
+              </a:rPr>
+              <a:t>Patrick Mooney</a:t>
+            </a:r>
+          </a:p>
+          <a:p>
+            <a:r>
+              <a:rPr lang="en-US" dirty="0" smtClean="0">
+                <a:solidFill>
+                  <a:schemeClr val="tx2"/>
+                </a:solidFill>
+                <a:latin typeface="Avenir Black Oblique"/>
+              </a:rPr>
+              <a:t>Joel Hammond-Turner</a:t>
+            </a:r>
+          </a:p>
+          <a:p>
+            <a:r>
+              <a:rPr lang="en-US" dirty="0" smtClean="0">
+                <a:solidFill>
+                  <a:schemeClr val="tx2"/>
+                </a:solidFill>
+                <a:latin typeface="Avenir Black Oblique"/>
+              </a:rPr>
+              <a:t>James </a:t>
+            </a:r>
+            <a:r>
+              <a:rPr lang="en-US" dirty="0" err="1" smtClean="0">
+                <a:solidFill>
+                  <a:schemeClr val="tx2"/>
+                </a:solidFill>
+                <a:latin typeface="Avenir Black Oblique"/>
+              </a:rPr>
+              <a:t>Counihan</a:t>
+            </a:r>
+            <a:r>
+              <a:rPr lang="en-US" dirty="0" smtClean="0">
+                <a:solidFill>
+                  <a:schemeClr val="tx2"/>
+                </a:solidFill>
+                <a:latin typeface="Avenir Black Oblique"/>
+              </a:rPr>
+              <a:t/>
+            </a:r>
+            <a:endParaRPr lang="en-US" dirty="0">
+              <a:solidFill>
+                <a:schemeClr val="tx2"/>
+              </a:solidFill>
+              <a:latin typeface="Avenir Black Oblique"/>
+            </a:endParaRPr>
+          </a:p>
+        </p:txBody>
+      </p:sp>
+      <p:pic>
+        <p:nvPicPr>
+          <p:cNvPr id="4" name="Picture 3" descr="CH.png"/>
+          <p:cNvPicPr>
+            <a:picLocks noChangeAspect="1"/>
+          </p:cNvPicPr>
+          <p:nvPr/>
+        </p:nvPicPr>
+        <p:blipFill>
+          <a:blip r:embed="rId2">
+            <a:extLst>
+              <a:ext uri="{28A0092B-C50C-407E-A947-70E740481C1C}">
+                <a14:useLocalDpi xmlns:a14="http://schemas.microsoft.com/office/drawing/2010/main" val="0"/>
+              </a:ext>
+            </a:extLst>
+          </a:blip>
+          <a:stretch>
+            <a:fillRect/>
+          </a:stretch>
+        </p:blipFill>
+        <p:spPr>
+          <a:xfrm>
+            <a:off x="7432856" y="205979"/>
+            <a:ext cx="1515051" cy="598047"/>
+          </a:xfrm>
+          <a:prstGeom prst="rect">
+            <a:avLst/>
+          </a:prstGeom>
+        </p:spPr>
+      </p:pic>
+    </p:spTree>
+    <p:extLst>
+      <p:ext uri="{BB962C8B-B14F-4D97-AF65-F5344CB8AC3E}">
+        <p14:creationId xmlns:p14="http://schemas.microsoft.com/office/powerpoint/2010/main" val="4290748159"/>
       </p:ext>
     </p:extLst>
   </p:cSld>

</xml_diff>